<commit_message>
Add & Update ppts
</commit_message>
<xml_diff>
--- a/主的喜樂是我力量(崇拜版).pptx
+++ b/主的喜樂是我力量(崇拜版).pptx
@@ -5,11 +5,16 @@
     <p:sldMasterId id="2147483660" r:id="rId1"/>
   </p:sldMasterIdLst>
   <p:sldIdLst>
-    <p:sldId id="256" r:id="rId2"/>
-    <p:sldId id="257" r:id="rId3"/>
-    <p:sldId id="258" r:id="rId4"/>
+    <p:sldId id="259" r:id="rId2"/>
+    <p:sldId id="260" r:id="rId3"/>
+    <p:sldId id="261" r:id="rId4"/>
+    <p:sldId id="262" r:id="rId5"/>
+    <p:sldId id="263" r:id="rId6"/>
+    <p:sldId id="264" r:id="rId7"/>
+    <p:sldId id="265" r:id="rId8"/>
+    <p:sldId id="266" r:id="rId9"/>
   </p:sldIdLst>
-  <p:sldSz cx="9144000" cy="6858000" type="screen4x3"/>
+  <p:sldSz cx="12192000" cy="6858000"/>
   <p:notesSz cx="6858000" cy="9144000"/>
   <p:defaultTextStyle>
     <a:defPPr>
@@ -106,6 +111,22 @@
       </a:defRPr>
     </a:lvl9pPr>
   </p:defaultTextStyle>
+  <p:extLst>
+    <p:ext uri="{EFAFB233-063F-42B5-8137-9DF3F51BA10A}">
+      <p15:sldGuideLst xmlns:p15="http://schemas.microsoft.com/office/powerpoint/2012/main">
+        <p15:guide id="1" orient="horz" pos="2160" userDrawn="1">
+          <p15:clr>
+            <a:srgbClr val="A4A3A4"/>
+          </p15:clr>
+        </p15:guide>
+        <p15:guide id="2" pos="3840" userDrawn="1">
+          <p15:clr>
+            <a:srgbClr val="A4A3A4"/>
+          </p15:clr>
+        </p15:guide>
+      </p15:sldGuideLst>
+    </p:ext>
+  </p:extLst>
 </p:presentation>
 </file>
 
@@ -138,8 +159,8 @@
         </p:nvSpPr>
         <p:spPr>
           <a:xfrm>
-            <a:off x="685800" y="2130425"/>
-            <a:ext cx="7772400" cy="1470025"/>
+            <a:off x="914400" y="2130426"/>
+            <a:ext cx="10363200" cy="1470025"/>
           </a:xfrm>
         </p:spPr>
         <p:txBody>
@@ -166,8 +187,8 @@
         </p:nvSpPr>
         <p:spPr>
           <a:xfrm>
-            <a:off x="1371600" y="3886200"/>
-            <a:ext cx="6400800" cy="1752600"/>
+            <a:off x="1828800" y="3886200"/>
+            <a:ext cx="8534400" cy="1752600"/>
           </a:xfrm>
         </p:spPr>
         <p:txBody>
@@ -291,7 +312,7 @@
             <a:fld id="{AE75BB81-9D85-4A71-ADCC-CA78DFBF337C}" type="datetimeFigureOut">
               <a:rPr lang="zh-TW" altLang="en-US" smtClean="0"/>
               <a:pPr/>
-              <a:t>2018/8/18</a:t>
+              <a:t>2021/3/13</a:t>
             </a:fld>
             <a:endParaRPr lang="zh-TW" altLang="en-US"/>
           </a:p>
@@ -458,7 +479,7 @@
             <a:fld id="{AE75BB81-9D85-4A71-ADCC-CA78DFBF337C}" type="datetimeFigureOut">
               <a:rPr lang="zh-TW" altLang="en-US" smtClean="0"/>
               <a:pPr/>
-              <a:t>2018/8/18</a:t>
+              <a:t>2021/3/13</a:t>
             </a:fld>
             <a:endParaRPr lang="zh-TW" altLang="en-US"/>
           </a:p>
@@ -544,8 +565,8 @@
         </p:nvSpPr>
         <p:spPr>
           <a:xfrm>
-            <a:off x="6629400" y="274638"/>
-            <a:ext cx="2057400" cy="5851525"/>
+            <a:off x="8839200" y="274639"/>
+            <a:ext cx="2743200" cy="5851525"/>
           </a:xfrm>
         </p:spPr>
         <p:txBody>
@@ -572,8 +593,8 @@
         </p:nvSpPr>
         <p:spPr>
           <a:xfrm>
-            <a:off x="457200" y="274638"/>
-            <a:ext cx="6019800" cy="5851525"/>
+            <a:off x="609600" y="274639"/>
+            <a:ext cx="8026400" cy="5851525"/>
           </a:xfrm>
         </p:spPr>
         <p:txBody>
@@ -635,7 +656,7 @@
             <a:fld id="{AE75BB81-9D85-4A71-ADCC-CA78DFBF337C}" type="datetimeFigureOut">
               <a:rPr lang="zh-TW" altLang="en-US" smtClean="0"/>
               <a:pPr/>
-              <a:t>2018/8/18</a:t>
+              <a:t>2021/3/13</a:t>
             </a:fld>
             <a:endParaRPr lang="zh-TW" altLang="en-US"/>
           </a:p>
@@ -802,7 +823,7 @@
             <a:fld id="{AE75BB81-9D85-4A71-ADCC-CA78DFBF337C}" type="datetimeFigureOut">
               <a:rPr lang="zh-TW" altLang="en-US" smtClean="0"/>
               <a:pPr/>
-              <a:t>2018/8/18</a:t>
+              <a:t>2021/3/13</a:t>
             </a:fld>
             <a:endParaRPr lang="zh-TW" altLang="en-US"/>
           </a:p>
@@ -888,8 +909,8 @@
         </p:nvSpPr>
         <p:spPr>
           <a:xfrm>
-            <a:off x="722313" y="4406900"/>
-            <a:ext cx="7772400" cy="1362075"/>
+            <a:off x="963084" y="4406901"/>
+            <a:ext cx="10363200" cy="1362075"/>
           </a:xfrm>
         </p:spPr>
         <p:txBody>
@@ -920,8 +941,8 @@
         </p:nvSpPr>
         <p:spPr>
           <a:xfrm>
-            <a:off x="722313" y="2906713"/>
-            <a:ext cx="7772400" cy="1500187"/>
+            <a:off x="963084" y="2906713"/>
+            <a:ext cx="10363200" cy="1500187"/>
           </a:xfrm>
         </p:spPr>
         <p:txBody>
@@ -1045,7 +1066,7 @@
             <a:fld id="{AE75BB81-9D85-4A71-ADCC-CA78DFBF337C}" type="datetimeFigureOut">
               <a:rPr lang="zh-TW" altLang="en-US" smtClean="0"/>
               <a:pPr/>
-              <a:t>2018/8/18</a:t>
+              <a:t>2021/3/13</a:t>
             </a:fld>
             <a:endParaRPr lang="zh-TW" altLang="en-US"/>
           </a:p>
@@ -1154,8 +1175,8 @@
         </p:nvSpPr>
         <p:spPr>
           <a:xfrm>
-            <a:off x="457200" y="1600200"/>
-            <a:ext cx="4038600" cy="4525963"/>
+            <a:off x="609600" y="1600201"/>
+            <a:ext cx="5384800" cy="4525963"/>
           </a:xfrm>
         </p:spPr>
         <p:txBody>
@@ -1239,8 +1260,8 @@
         </p:nvSpPr>
         <p:spPr>
           <a:xfrm>
-            <a:off x="4648200" y="1600200"/>
-            <a:ext cx="4038600" cy="4525963"/>
+            <a:off x="6197600" y="1600201"/>
+            <a:ext cx="5384800" cy="4525963"/>
           </a:xfrm>
         </p:spPr>
         <p:txBody>
@@ -1330,7 +1351,7 @@
             <a:fld id="{AE75BB81-9D85-4A71-ADCC-CA78DFBF337C}" type="datetimeFigureOut">
               <a:rPr lang="zh-TW" altLang="en-US" smtClean="0"/>
               <a:pPr/>
-              <a:t>2018/8/18</a:t>
+              <a:t>2021/3/13</a:t>
             </a:fld>
             <a:endParaRPr lang="zh-TW" altLang="en-US"/>
           </a:p>
@@ -1443,8 +1464,8 @@
         </p:nvSpPr>
         <p:spPr>
           <a:xfrm>
-            <a:off x="457200" y="1535113"/>
-            <a:ext cx="4040188" cy="639762"/>
+            <a:off x="609600" y="1535113"/>
+            <a:ext cx="5386917" cy="639762"/>
           </a:xfrm>
         </p:spPr>
         <p:txBody>
@@ -1508,8 +1529,8 @@
         </p:nvSpPr>
         <p:spPr>
           <a:xfrm>
-            <a:off x="457200" y="2174875"/>
-            <a:ext cx="4040188" cy="3951288"/>
+            <a:off x="609600" y="2174875"/>
+            <a:ext cx="5386917" cy="3951288"/>
           </a:xfrm>
         </p:spPr>
         <p:txBody>
@@ -1593,8 +1614,8 @@
         </p:nvSpPr>
         <p:spPr>
           <a:xfrm>
-            <a:off x="4645025" y="1535113"/>
-            <a:ext cx="4041775" cy="639762"/>
+            <a:off x="6193368" y="1535113"/>
+            <a:ext cx="5389033" cy="639762"/>
           </a:xfrm>
         </p:spPr>
         <p:txBody>
@@ -1658,8 +1679,8 @@
         </p:nvSpPr>
         <p:spPr>
           <a:xfrm>
-            <a:off x="4645025" y="2174875"/>
-            <a:ext cx="4041775" cy="3951288"/>
+            <a:off x="6193368" y="2174875"/>
+            <a:ext cx="5389033" cy="3951288"/>
           </a:xfrm>
         </p:spPr>
         <p:txBody>
@@ -1749,7 +1770,7 @@
             <a:fld id="{AE75BB81-9D85-4A71-ADCC-CA78DFBF337C}" type="datetimeFigureOut">
               <a:rPr lang="zh-TW" altLang="en-US" smtClean="0"/>
               <a:pPr/>
-              <a:t>2018/8/18</a:t>
+              <a:t>2021/3/13</a:t>
             </a:fld>
             <a:endParaRPr lang="zh-TW" altLang="en-US"/>
           </a:p>
@@ -1864,7 +1885,7 @@
             <a:fld id="{AE75BB81-9D85-4A71-ADCC-CA78DFBF337C}" type="datetimeFigureOut">
               <a:rPr lang="zh-TW" altLang="en-US" smtClean="0"/>
               <a:pPr/>
-              <a:t>2018/8/18</a:t>
+              <a:t>2021/3/13</a:t>
             </a:fld>
             <a:endParaRPr lang="zh-TW" altLang="en-US"/>
           </a:p>
@@ -1956,7 +1977,7 @@
             <a:fld id="{AE75BB81-9D85-4A71-ADCC-CA78DFBF337C}" type="datetimeFigureOut">
               <a:rPr lang="zh-TW" altLang="en-US" smtClean="0"/>
               <a:pPr/>
-              <a:t>2018/8/18</a:t>
+              <a:t>2021/3/13</a:t>
             </a:fld>
             <a:endParaRPr lang="zh-TW" altLang="en-US"/>
           </a:p>
@@ -2042,8 +2063,8 @@
         </p:nvSpPr>
         <p:spPr>
           <a:xfrm>
-            <a:off x="457200" y="273050"/>
-            <a:ext cx="3008313" cy="1162050"/>
+            <a:off x="609601" y="273050"/>
+            <a:ext cx="4011084" cy="1162050"/>
           </a:xfrm>
         </p:spPr>
         <p:txBody>
@@ -2074,8 +2095,8 @@
         </p:nvSpPr>
         <p:spPr>
           <a:xfrm>
-            <a:off x="3575050" y="273050"/>
-            <a:ext cx="5111750" cy="5853113"/>
+            <a:off x="4766733" y="273051"/>
+            <a:ext cx="6815667" cy="5853113"/>
           </a:xfrm>
         </p:spPr>
         <p:txBody>
@@ -2159,8 +2180,8 @@
         </p:nvSpPr>
         <p:spPr>
           <a:xfrm>
-            <a:off x="457200" y="1435100"/>
-            <a:ext cx="3008313" cy="4691063"/>
+            <a:off x="609601" y="1435101"/>
+            <a:ext cx="4011084" cy="4691063"/>
           </a:xfrm>
         </p:spPr>
         <p:txBody>
@@ -2230,7 +2251,7 @@
             <a:fld id="{AE75BB81-9D85-4A71-ADCC-CA78DFBF337C}" type="datetimeFigureOut">
               <a:rPr lang="zh-TW" altLang="en-US" smtClean="0"/>
               <a:pPr/>
-              <a:t>2018/8/18</a:t>
+              <a:t>2021/3/13</a:t>
             </a:fld>
             <a:endParaRPr lang="zh-TW" altLang="en-US"/>
           </a:p>
@@ -2316,8 +2337,8 @@
         </p:nvSpPr>
         <p:spPr>
           <a:xfrm>
-            <a:off x="1792288" y="4800600"/>
-            <a:ext cx="5486400" cy="566738"/>
+            <a:off x="2389717" y="4800600"/>
+            <a:ext cx="7315200" cy="566738"/>
           </a:xfrm>
         </p:spPr>
         <p:txBody>
@@ -2348,8 +2369,8 @@
         </p:nvSpPr>
         <p:spPr>
           <a:xfrm>
-            <a:off x="1792288" y="612775"/>
-            <a:ext cx="5486400" cy="4114800"/>
+            <a:off x="2389717" y="612775"/>
+            <a:ext cx="7315200" cy="4114800"/>
           </a:xfrm>
         </p:spPr>
         <p:txBody>
@@ -2413,8 +2434,8 @@
         </p:nvSpPr>
         <p:spPr>
           <a:xfrm>
-            <a:off x="1792288" y="5367338"/>
-            <a:ext cx="5486400" cy="804862"/>
+            <a:off x="2389717" y="5367338"/>
+            <a:ext cx="7315200" cy="804862"/>
           </a:xfrm>
         </p:spPr>
         <p:txBody>
@@ -2484,7 +2505,7 @@
             <a:fld id="{AE75BB81-9D85-4A71-ADCC-CA78DFBF337C}" type="datetimeFigureOut">
               <a:rPr lang="zh-TW" altLang="en-US" smtClean="0"/>
               <a:pPr/>
-              <a:t>2018/8/18</a:t>
+              <a:t>2021/3/13</a:t>
             </a:fld>
             <a:endParaRPr lang="zh-TW" altLang="en-US"/>
           </a:p>
@@ -2580,8 +2601,8 @@
         </p:nvSpPr>
         <p:spPr>
           <a:xfrm>
-            <a:off x="457200" y="274638"/>
-            <a:ext cx="8229600" cy="1143000"/>
+            <a:off x="609600" y="274638"/>
+            <a:ext cx="10972800" cy="1143000"/>
           </a:xfrm>
           <a:prstGeom prst="rect">
             <a:avLst/>
@@ -2613,8 +2634,8 @@
         </p:nvSpPr>
         <p:spPr>
           <a:xfrm>
-            <a:off x="457200" y="1600200"/>
-            <a:ext cx="8229600" cy="4525963"/>
+            <a:off x="609600" y="1600201"/>
+            <a:ext cx="10972800" cy="4525963"/>
           </a:xfrm>
           <a:prstGeom prst="rect">
             <a:avLst/>
@@ -2675,8 +2696,8 @@
         </p:nvSpPr>
         <p:spPr>
           <a:xfrm>
-            <a:off x="457200" y="6356350"/>
-            <a:ext cx="2133600" cy="365125"/>
+            <a:off x="609600" y="6356351"/>
+            <a:ext cx="2844800" cy="365125"/>
           </a:xfrm>
           <a:prstGeom prst="rect">
             <a:avLst/>
@@ -2699,7 +2720,7 @@
             <a:fld id="{AE75BB81-9D85-4A71-ADCC-CA78DFBF337C}" type="datetimeFigureOut">
               <a:rPr lang="zh-TW" altLang="en-US" smtClean="0"/>
               <a:pPr/>
-              <a:t>2018/8/18</a:t>
+              <a:t>2021/3/13</a:t>
             </a:fld>
             <a:endParaRPr lang="zh-TW" altLang="en-US"/>
           </a:p>
@@ -2717,8 +2738,8 @@
         </p:nvSpPr>
         <p:spPr>
           <a:xfrm>
-            <a:off x="3124200" y="6356350"/>
-            <a:ext cx="2895600" cy="365125"/>
+            <a:off x="4165600" y="6356351"/>
+            <a:ext cx="3860800" cy="365125"/>
           </a:xfrm>
           <a:prstGeom prst="rect">
             <a:avLst/>
@@ -2754,8 +2775,8 @@
         </p:nvSpPr>
         <p:spPr>
           <a:xfrm>
-            <a:off x="6553200" y="6356350"/>
-            <a:ext cx="2133600" cy="365125"/>
+            <a:off x="8737600" y="6356351"/>
+            <a:ext cx="2844800" cy="365125"/>
           </a:xfrm>
           <a:prstGeom prst="rect">
             <a:avLst/>
@@ -3080,235 +3101,61 @@
             <p:ph type="title"/>
           </p:nvPr>
         </p:nvSpPr>
-        <p:spPr/>
+        <p:spPr>
+          <a:xfrm>
+            <a:off x="0" y="2756925"/>
+            <a:ext cx="12192000" cy="1143000"/>
+          </a:xfrm>
+        </p:spPr>
         <p:txBody>
           <a:bodyPr>
-            <a:normAutofit/>
+            <a:noAutofit/>
           </a:bodyPr>
           <a:lstStyle/>
           <a:p>
             <a:r>
-              <a:rPr lang="zh-TW" altLang="en-US" b="1" dirty="0" smtClean="0">
-                <a:solidFill>
-                  <a:srgbClr val="000066"/>
-                </a:solidFill>
+              <a:rPr lang="zh-TW" altLang="en-US" sz="7200" b="1" i="1" dirty="0">
+                <a:solidFill>
+                  <a:srgbClr val="660033"/>
+                </a:solidFill>
+                <a:effectLst>
+                  <a:outerShdw blurRad="38100" dist="38100" dir="2700000" algn="tl">
+                    <a:srgbClr val="000000">
+                      <a:alpha val="43137"/>
+                    </a:srgbClr>
+                  </a:outerShdw>
+                </a:effectLst>
                 <a:latin typeface="微軟正黑體" pitchFamily="34" charset="-120"/>
                 <a:ea typeface="微軟正黑體" pitchFamily="34" charset="-120"/>
               </a:rPr>
-              <a:t>主的喜樂是我力量</a:t>
-            </a:r>
-            <a:endParaRPr lang="zh-TW" altLang="en-US" b="1" dirty="0">
-              <a:solidFill>
-                <a:srgbClr val="000066"/>
-              </a:solidFill>
-              <a:latin typeface="微軟正黑體" pitchFamily="34" charset="-120"/>
-              <a:ea typeface="微軟正黑體" pitchFamily="34" charset="-120"/>
-            </a:endParaRPr>
-          </a:p>
-        </p:txBody>
-      </p:sp>
-      <p:sp>
-        <p:nvSpPr>
-          <p:cNvPr id="5" name="內容版面配置區 4"/>
-          <p:cNvSpPr>
-            <a:spLocks noGrp="1"/>
-          </p:cNvSpPr>
-          <p:nvPr>
-            <p:ph idx="1"/>
-          </p:nvPr>
-        </p:nvSpPr>
-        <p:spPr/>
-        <p:txBody>
-          <a:bodyPr>
-            <a:noAutofit/>
-          </a:bodyPr>
-          <a:lstStyle/>
-          <a:p>
-            <a:pPr algn="ctr">
-              <a:buNone/>
-            </a:pPr>
-            <a:r>
-              <a:rPr lang="zh-TW" altLang="en-US" sz="5400" b="1" dirty="0">
-                <a:solidFill>
-                  <a:srgbClr val="000066"/>
-                </a:solidFill>
+              <a:t>主</a:t>
+            </a:r>
+            <a:r>
+              <a:rPr lang="zh-TW" altLang="en-US" sz="7200" b="1" i="1" dirty="0">
+                <a:solidFill>
+                  <a:srgbClr val="660033"/>
+                </a:solidFill>
+                <a:effectLst>
+                  <a:outerShdw blurRad="38100" dist="38100" dir="2700000" algn="tl">
+                    <a:srgbClr val="000000">
+                      <a:alpha val="43137"/>
+                    </a:srgbClr>
+                  </a:outerShdw>
+                </a:effectLst>
                 <a:latin typeface="微軟正黑體" pitchFamily="34" charset="-120"/>
                 <a:ea typeface="微軟正黑體" pitchFamily="34" charset="-120"/>
               </a:rPr>
-              <a:t>主的喜樂是我</a:t>
-            </a:r>
-            <a:r>
-              <a:rPr lang="zh-TW" altLang="en-US" sz="5400" b="1" dirty="0" smtClean="0">
-                <a:solidFill>
-                  <a:srgbClr val="000066"/>
-                </a:solidFill>
-                <a:latin typeface="微軟正黑體" pitchFamily="34" charset="-120"/>
-                <a:ea typeface="微軟正黑體" pitchFamily="34" charset="-120"/>
-              </a:rPr>
-              <a:t>力量</a:t>
-            </a:r>
-            <a:endParaRPr lang="en-US" altLang="zh-TW" sz="5400" b="1" dirty="0" smtClean="0">
-              <a:solidFill>
-                <a:srgbClr val="000066"/>
-              </a:solidFill>
-              <a:latin typeface="微軟正黑體" pitchFamily="34" charset="-120"/>
-              <a:ea typeface="微軟正黑體" pitchFamily="34" charset="-120"/>
-            </a:endParaRPr>
-          </a:p>
-          <a:p>
-            <a:pPr algn="ctr">
-              <a:buNone/>
-            </a:pPr>
-            <a:r>
-              <a:rPr lang="zh-TW" altLang="en-US" sz="5400" b="1" dirty="0" smtClean="0">
-                <a:solidFill>
-                  <a:srgbClr val="000066"/>
-                </a:solidFill>
-                <a:latin typeface="微軟正黑體" pitchFamily="34" charset="-120"/>
-                <a:ea typeface="微軟正黑體" pitchFamily="34" charset="-120"/>
-              </a:rPr>
-              <a:t>你</a:t>
-            </a:r>
-            <a:r>
-              <a:rPr lang="zh-TW" altLang="en-US" sz="5400" b="1" dirty="0">
-                <a:solidFill>
-                  <a:srgbClr val="000066"/>
-                </a:solidFill>
-                <a:latin typeface="微軟正黑體" pitchFamily="34" charset="-120"/>
-                <a:ea typeface="微軟正黑體" pitchFamily="34" charset="-120"/>
-              </a:rPr>
-              <a:t>的救恩是我</a:t>
-            </a:r>
-            <a:r>
-              <a:rPr lang="zh-TW" altLang="en-US" sz="5400" b="1" dirty="0" smtClean="0">
-                <a:solidFill>
-                  <a:srgbClr val="000066"/>
-                </a:solidFill>
-                <a:latin typeface="微軟正黑體" pitchFamily="34" charset="-120"/>
-                <a:ea typeface="微軟正黑體" pitchFamily="34" charset="-120"/>
-              </a:rPr>
-              <a:t>盼望</a:t>
-            </a:r>
-            <a:endParaRPr lang="en-US" altLang="zh-TW" sz="5400" b="1" dirty="0">
-              <a:solidFill>
-                <a:srgbClr val="000066"/>
-              </a:solidFill>
-              <a:latin typeface="微軟正黑體" pitchFamily="34" charset="-120"/>
-              <a:ea typeface="微軟正黑體" pitchFamily="34" charset="-120"/>
-            </a:endParaRPr>
-          </a:p>
-          <a:p>
-            <a:pPr algn="ctr">
-              <a:buNone/>
-            </a:pPr>
-            <a:r>
-              <a:rPr lang="zh-TW" altLang="en-US" sz="5400" b="1" dirty="0" smtClean="0">
-                <a:solidFill>
-                  <a:srgbClr val="000066"/>
-                </a:solidFill>
-                <a:latin typeface="微軟正黑體" pitchFamily="34" charset="-120"/>
-                <a:ea typeface="微軟正黑體" pitchFamily="34" charset="-120"/>
-              </a:rPr>
-              <a:t>雖然</a:t>
-            </a:r>
-            <a:r>
-              <a:rPr lang="zh-TW" altLang="en-US" sz="5400" b="1" dirty="0">
-                <a:solidFill>
-                  <a:srgbClr val="000066"/>
-                </a:solidFill>
-                <a:latin typeface="微軟正黑體" pitchFamily="34" charset="-120"/>
-                <a:ea typeface="微軟正黑體" pitchFamily="34" charset="-120"/>
-              </a:rPr>
-              <a:t>橄欖樹不</a:t>
-            </a:r>
-            <a:r>
-              <a:rPr lang="zh-TW" altLang="en-US" sz="5400" b="1" dirty="0" smtClean="0">
-                <a:solidFill>
-                  <a:srgbClr val="000066"/>
-                </a:solidFill>
-                <a:latin typeface="微軟正黑體" pitchFamily="34" charset="-120"/>
-                <a:ea typeface="微軟正黑體" pitchFamily="34" charset="-120"/>
-              </a:rPr>
-              <a:t>效力</a:t>
-            </a:r>
-            <a:endParaRPr lang="en-US" altLang="zh-TW" sz="5400" b="1" dirty="0" smtClean="0">
-              <a:solidFill>
-                <a:srgbClr val="000066"/>
-              </a:solidFill>
-              <a:latin typeface="微軟正黑體" pitchFamily="34" charset="-120"/>
-              <a:ea typeface="微軟正黑體" pitchFamily="34" charset="-120"/>
-            </a:endParaRPr>
-          </a:p>
-          <a:p>
-            <a:pPr algn="ctr">
-              <a:buNone/>
-            </a:pPr>
-            <a:r>
-              <a:rPr lang="zh-TW" altLang="en-US" sz="5400" b="1" dirty="0" smtClean="0">
-                <a:solidFill>
-                  <a:srgbClr val="000066"/>
-                </a:solidFill>
-                <a:latin typeface="微軟正黑體" pitchFamily="34" charset="-120"/>
-                <a:ea typeface="微軟正黑體" pitchFamily="34" charset="-120"/>
-              </a:rPr>
-              <a:t>也許</a:t>
-            </a:r>
-            <a:r>
-              <a:rPr lang="zh-TW" altLang="en-US" sz="5400" b="1" dirty="0">
-                <a:solidFill>
-                  <a:srgbClr val="000066"/>
-                </a:solidFill>
-                <a:latin typeface="微軟正黑體" pitchFamily="34" charset="-120"/>
-                <a:ea typeface="微軟正黑體" pitchFamily="34" charset="-120"/>
-              </a:rPr>
-              <a:t>葡萄樹不</a:t>
-            </a:r>
-            <a:r>
-              <a:rPr lang="zh-TW" altLang="en-US" sz="5400" b="1" dirty="0" smtClean="0">
-                <a:solidFill>
-                  <a:srgbClr val="000066"/>
-                </a:solidFill>
-                <a:latin typeface="微軟正黑體" pitchFamily="34" charset="-120"/>
-                <a:ea typeface="微軟正黑體" pitchFamily="34" charset="-120"/>
-              </a:rPr>
-              <a:t>結果</a:t>
-            </a:r>
-            <a:endParaRPr lang="en-US" altLang="zh-TW" sz="5400" b="1" dirty="0" smtClean="0">
-              <a:solidFill>
-                <a:srgbClr val="000066"/>
-              </a:solidFill>
-              <a:latin typeface="微軟正黑體" pitchFamily="34" charset="-120"/>
-              <a:ea typeface="微軟正黑體" pitchFamily="34" charset="-120"/>
-            </a:endParaRPr>
-          </a:p>
-          <a:p>
-            <a:pPr algn="ctr">
-              <a:buNone/>
-            </a:pPr>
-            <a:r>
-              <a:rPr lang="zh-TW" altLang="en-US" sz="5400" b="1" dirty="0" smtClean="0">
-                <a:solidFill>
-                  <a:srgbClr val="000066"/>
-                </a:solidFill>
-                <a:latin typeface="微軟正黑體" pitchFamily="34" charset="-120"/>
-                <a:ea typeface="微軟正黑體" pitchFamily="34" charset="-120"/>
-              </a:rPr>
-              <a:t>我</a:t>
-            </a:r>
-            <a:r>
-              <a:rPr lang="zh-TW" altLang="en-US" sz="5400" b="1" dirty="0">
-                <a:solidFill>
-                  <a:srgbClr val="000066"/>
-                </a:solidFill>
-                <a:latin typeface="微軟正黑體" pitchFamily="34" charset="-120"/>
-                <a:ea typeface="微軟正黑體" pitchFamily="34" charset="-120"/>
-              </a:rPr>
-              <a:t>仍因救我的神歡欣快樂</a:t>
+              <a:t>的喜樂是我力量</a:t>
             </a:r>
           </a:p>
         </p:txBody>
       </p:sp>
     </p:spTree>
+    <p:extLst>
+      <p:ext uri="{BB962C8B-B14F-4D97-AF65-F5344CB8AC3E}">
+        <p14:creationId xmlns:p14="http://schemas.microsoft.com/office/powerpoint/2010/main" val="2230125928"/>
+      </p:ext>
+    </p:extLst>
   </p:cSld>
   <p:clrMapOvr>
     <a:masterClrMapping/>
@@ -3335,201 +3182,87 @@
       </p:grpSpPr>
       <p:sp>
         <p:nvSpPr>
-          <p:cNvPr id="4" name="標題 3"/>
-          <p:cNvSpPr>
-            <a:spLocks noGrp="1"/>
-          </p:cNvSpPr>
-          <p:nvPr>
-            <p:ph type="title"/>
-          </p:nvPr>
-        </p:nvSpPr>
-        <p:spPr/>
-        <p:txBody>
-          <a:bodyPr>
+          <p:cNvPr id="5" name="內容版面配置區 4"/>
+          <p:cNvSpPr>
+            <a:spLocks noGrp="1"/>
+          </p:cNvSpPr>
+          <p:nvPr>
+            <p:ph idx="1"/>
+          </p:nvPr>
+        </p:nvSpPr>
+        <p:spPr>
+          <a:xfrm>
+            <a:off x="0" y="2084851"/>
+            <a:ext cx="12192000" cy="2404863"/>
+          </a:xfrm>
+        </p:spPr>
+        <p:txBody>
+          <a:bodyPr anchor="ctr">
             <a:normAutofit/>
           </a:bodyPr>
           <a:lstStyle/>
           <a:p>
-            <a:r>
-              <a:rPr lang="zh-TW" altLang="en-US" b="1" dirty="0" smtClean="0">
-                <a:solidFill>
-                  <a:srgbClr val="000066"/>
+            <a:pPr algn="ctr">
+              <a:buNone/>
+            </a:pPr>
+            <a:r>
+              <a:rPr lang="zh-TW" altLang="en-US" sz="6400" b="1" dirty="0">
+                <a:solidFill>
+                  <a:srgbClr val="660033"/>
                 </a:solidFill>
                 <a:latin typeface="微軟正黑體" pitchFamily="34" charset="-120"/>
                 <a:ea typeface="微軟正黑體" pitchFamily="34" charset="-120"/>
               </a:rPr>
               <a:t>主的喜樂是我力量</a:t>
             </a:r>
-            <a:endParaRPr lang="zh-TW" altLang="en-US" b="1" dirty="0">
+            <a:endParaRPr lang="en-US" altLang="zh-TW" sz="6400" b="1" dirty="0">
               <a:solidFill>
-                <a:srgbClr val="000066"/>
+                <a:srgbClr val="660033"/>
               </a:solidFill>
               <a:latin typeface="微軟正黑體" pitchFamily="34" charset="-120"/>
               <a:ea typeface="微軟正黑體" pitchFamily="34" charset="-120"/>
             </a:endParaRPr>
           </a:p>
-        </p:txBody>
-      </p:sp>
-      <p:sp>
-        <p:nvSpPr>
-          <p:cNvPr id="5" name="內容版面配置區 4"/>
-          <p:cNvSpPr>
-            <a:spLocks noGrp="1"/>
-          </p:cNvSpPr>
-          <p:nvPr>
-            <p:ph idx="1"/>
-          </p:nvPr>
-        </p:nvSpPr>
-        <p:spPr/>
-        <p:txBody>
-          <a:bodyPr>
-            <a:noAutofit/>
-          </a:bodyPr>
-          <a:lstStyle/>
           <a:p>
             <a:pPr algn="ctr">
               <a:buNone/>
             </a:pPr>
             <a:r>
-              <a:rPr lang="zh-TW" altLang="en-US" sz="5400" b="1" dirty="0">
-                <a:solidFill>
-                  <a:srgbClr val="000066"/>
+              <a:rPr lang="zh-CN" altLang="en-US" sz="6400" b="1" dirty="0">
+                <a:solidFill>
+                  <a:srgbClr val="660033"/>
                 </a:solidFill>
                 <a:latin typeface="微軟正黑體" pitchFamily="34" charset="-120"/>
                 <a:ea typeface="微軟正黑體" pitchFamily="34" charset="-120"/>
               </a:rPr>
-              <a:t>我要</a:t>
-            </a:r>
-            <a:r>
-              <a:rPr lang="zh-TW" altLang="en-US" sz="5400" b="1" dirty="0" smtClean="0">
-                <a:solidFill>
-                  <a:srgbClr val="000066"/>
+              <a:t>袮</a:t>
+            </a:r>
+            <a:r>
+              <a:rPr lang="zh-TW" altLang="en-US" sz="6400" b="1" dirty="0">
+                <a:solidFill>
+                  <a:srgbClr val="660033"/>
                 </a:solidFill>
                 <a:latin typeface="微軟正黑體" pitchFamily="34" charset="-120"/>
                 <a:ea typeface="微軟正黑體" pitchFamily="34" charset="-120"/>
               </a:rPr>
-              <a:t>讚美</a:t>
-            </a:r>
-            <a:endParaRPr lang="en-US" altLang="zh-TW" sz="5400" b="1" dirty="0" smtClean="0">
+              <a:t>的救恩是我盼望</a:t>
+            </a:r>
+            <a:endParaRPr lang="en-US" altLang="zh-TW" sz="6400" b="1" dirty="0">
               <a:solidFill>
-                <a:srgbClr val="000066"/>
+                <a:srgbClr val="660033"/>
               </a:solidFill>
               <a:latin typeface="微軟正黑體" pitchFamily="34" charset="-120"/>
               <a:ea typeface="微軟正黑體" pitchFamily="34" charset="-120"/>
             </a:endParaRPr>
           </a:p>
-          <a:p>
-            <a:pPr algn="ctr">
-              <a:buNone/>
-            </a:pPr>
-            <a:r>
-              <a:rPr lang="zh-TW" altLang="en-US" sz="5400" b="1" dirty="0" smtClean="0">
-                <a:solidFill>
-                  <a:srgbClr val="000066"/>
-                </a:solidFill>
-                <a:latin typeface="微軟正黑體" pitchFamily="34" charset="-120"/>
-                <a:ea typeface="微軟正黑體" pitchFamily="34" charset="-120"/>
-              </a:rPr>
-              <a:t>無論</a:t>
-            </a:r>
-            <a:r>
-              <a:rPr lang="zh-TW" altLang="en-US" sz="5400" b="1" dirty="0">
-                <a:solidFill>
-                  <a:srgbClr val="000066"/>
-                </a:solidFill>
-                <a:latin typeface="微軟正黑體" pitchFamily="34" charset="-120"/>
-                <a:ea typeface="微軟正黑體" pitchFamily="34" charset="-120"/>
-              </a:rPr>
-              <a:t>得時或不得</a:t>
-            </a:r>
-            <a:r>
-              <a:rPr lang="zh-TW" altLang="en-US" sz="5400" b="1" dirty="0" smtClean="0">
-                <a:solidFill>
-                  <a:srgbClr val="000066"/>
-                </a:solidFill>
-                <a:latin typeface="微軟正黑體" pitchFamily="34" charset="-120"/>
-                <a:ea typeface="微軟正黑體" pitchFamily="34" charset="-120"/>
-              </a:rPr>
-              <a:t>時</a:t>
-            </a:r>
-            <a:endParaRPr lang="en-US" altLang="zh-TW" sz="5400" b="1" dirty="0" smtClean="0">
-              <a:solidFill>
-                <a:srgbClr val="000066"/>
-              </a:solidFill>
-              <a:latin typeface="微軟正黑體" pitchFamily="34" charset="-120"/>
-              <a:ea typeface="微軟正黑體" pitchFamily="34" charset="-120"/>
-            </a:endParaRPr>
-          </a:p>
-          <a:p>
-            <a:pPr algn="ctr">
-              <a:buNone/>
-            </a:pPr>
-            <a:r>
-              <a:rPr lang="zh-TW" altLang="en-US" sz="5400" b="1" dirty="0" smtClean="0">
-                <a:solidFill>
-                  <a:srgbClr val="000066"/>
-                </a:solidFill>
-                <a:latin typeface="微軟正黑體" pitchFamily="34" charset="-120"/>
-                <a:ea typeface="微軟正黑體" pitchFamily="34" charset="-120"/>
-              </a:rPr>
-              <a:t>我</a:t>
-            </a:r>
-            <a:r>
-              <a:rPr lang="zh-TW" altLang="en-US" sz="5400" b="1" dirty="0">
-                <a:solidFill>
-                  <a:srgbClr val="000066"/>
-                </a:solidFill>
-                <a:latin typeface="微軟正黑體" pitchFamily="34" charset="-120"/>
-                <a:ea typeface="微軟正黑體" pitchFamily="34" charset="-120"/>
-              </a:rPr>
-              <a:t>要</a:t>
-            </a:r>
-            <a:r>
-              <a:rPr lang="zh-TW" altLang="en-US" sz="5400" b="1" dirty="0" smtClean="0">
-                <a:solidFill>
-                  <a:srgbClr val="000066"/>
-                </a:solidFill>
-                <a:latin typeface="微軟正黑體" pitchFamily="34" charset="-120"/>
-                <a:ea typeface="微軟正黑體" pitchFamily="34" charset="-120"/>
-              </a:rPr>
-              <a:t>讚美</a:t>
-            </a:r>
-            <a:endParaRPr lang="en-US" altLang="zh-TW" sz="5400" b="1" dirty="0" smtClean="0">
-              <a:solidFill>
-                <a:srgbClr val="000066"/>
-              </a:solidFill>
-              <a:latin typeface="微軟正黑體" pitchFamily="34" charset="-120"/>
-              <a:ea typeface="微軟正黑體" pitchFamily="34" charset="-120"/>
-            </a:endParaRPr>
-          </a:p>
-          <a:p>
-            <a:pPr algn="ctr">
-              <a:buNone/>
-            </a:pPr>
-            <a:r>
-              <a:rPr lang="zh-TW" altLang="en-US" sz="5400" b="1" dirty="0" smtClean="0">
-                <a:solidFill>
-                  <a:srgbClr val="000066"/>
-                </a:solidFill>
-                <a:latin typeface="微軟正黑體" pitchFamily="34" charset="-120"/>
-                <a:ea typeface="微軟正黑體" pitchFamily="34" charset="-120"/>
-              </a:rPr>
-              <a:t>每天</a:t>
-            </a:r>
-            <a:r>
-              <a:rPr lang="zh-TW" altLang="en-US" sz="5400" b="1" dirty="0">
-                <a:solidFill>
-                  <a:srgbClr val="000066"/>
-                </a:solidFill>
-                <a:latin typeface="微軟正黑體" pitchFamily="34" charset="-120"/>
-                <a:ea typeface="微軟正黑體" pitchFamily="34" charset="-120"/>
-              </a:rPr>
-              <a:t>從日出到日落</a:t>
-            </a:r>
-          </a:p>
         </p:txBody>
       </p:sp>
     </p:spTree>
+    <p:extLst>
+      <p:ext uri="{BB962C8B-B14F-4D97-AF65-F5344CB8AC3E}">
+        <p14:creationId xmlns:p14="http://schemas.microsoft.com/office/powerpoint/2010/main" val="2976777408"/>
+      </p:ext>
+    </p:extLst>
   </p:cSld>
   <p:clrMapOvr>
     <a:masterClrMapping/>
@@ -3556,41 +3289,101 @@
       </p:grpSpPr>
       <p:sp>
         <p:nvSpPr>
-          <p:cNvPr id="4" name="標題 3"/>
-          <p:cNvSpPr>
-            <a:spLocks noGrp="1"/>
-          </p:cNvSpPr>
-          <p:nvPr>
-            <p:ph type="title"/>
-          </p:nvPr>
-        </p:nvSpPr>
-        <p:spPr/>
-        <p:txBody>
-          <a:bodyPr>
+          <p:cNvPr id="5" name="內容版面配置區 4"/>
+          <p:cNvSpPr>
+            <a:spLocks noGrp="1"/>
+          </p:cNvSpPr>
+          <p:nvPr>
+            <p:ph idx="1"/>
+          </p:nvPr>
+        </p:nvSpPr>
+        <p:spPr>
+          <a:xfrm>
+            <a:off x="0" y="2084851"/>
+            <a:ext cx="12192000" cy="2404863"/>
+          </a:xfrm>
+        </p:spPr>
+        <p:txBody>
+          <a:bodyPr anchor="ctr">
             <a:normAutofit/>
           </a:bodyPr>
           <a:lstStyle/>
           <a:p>
-            <a:r>
-              <a:rPr lang="zh-TW" altLang="en-US" b="1" dirty="0" smtClean="0">
-                <a:solidFill>
-                  <a:srgbClr val="000066"/>
+            <a:pPr algn="ctr">
+              <a:buNone/>
+            </a:pPr>
+            <a:r>
+              <a:rPr lang="zh-TW" altLang="en-US" sz="6400" b="1" dirty="0">
+                <a:solidFill>
+                  <a:srgbClr val="660033"/>
                 </a:solidFill>
                 <a:latin typeface="微軟正黑體" pitchFamily="34" charset="-120"/>
                 <a:ea typeface="微軟正黑體" pitchFamily="34" charset="-120"/>
               </a:rPr>
-              <a:t>主的喜樂是我力量</a:t>
-            </a:r>
-            <a:endParaRPr lang="zh-TW" altLang="en-US" b="1" dirty="0">
+              <a:t>雖然橄欖樹不效力</a:t>
+            </a:r>
+            <a:endParaRPr lang="en-US" altLang="zh-TW" sz="6400" b="1" dirty="0">
               <a:solidFill>
-                <a:srgbClr val="000066"/>
+                <a:srgbClr val="660033"/>
               </a:solidFill>
               <a:latin typeface="微軟正黑體" pitchFamily="34" charset="-120"/>
               <a:ea typeface="微軟正黑體" pitchFamily="34" charset="-120"/>
             </a:endParaRPr>
           </a:p>
-        </p:txBody>
-      </p:sp>
+          <a:p>
+            <a:pPr algn="ctr">
+              <a:buNone/>
+            </a:pPr>
+            <a:r>
+              <a:rPr lang="zh-TW" altLang="en-US" sz="6400" b="1" dirty="0">
+                <a:solidFill>
+                  <a:srgbClr val="660033"/>
+                </a:solidFill>
+                <a:latin typeface="微軟正黑體" pitchFamily="34" charset="-120"/>
+                <a:ea typeface="微軟正黑體" pitchFamily="34" charset="-120"/>
+              </a:rPr>
+              <a:t>也許葡萄樹不結果</a:t>
+            </a:r>
+            <a:endParaRPr lang="en-US" altLang="zh-TW" sz="6400" b="1" dirty="0">
+              <a:solidFill>
+                <a:srgbClr val="660033"/>
+              </a:solidFill>
+              <a:latin typeface="微軟正黑體" pitchFamily="34" charset="-120"/>
+              <a:ea typeface="微軟正黑體" pitchFamily="34" charset="-120"/>
+            </a:endParaRPr>
+          </a:p>
+        </p:txBody>
+      </p:sp>
+    </p:spTree>
+    <p:extLst>
+      <p:ext uri="{BB962C8B-B14F-4D97-AF65-F5344CB8AC3E}">
+        <p14:creationId xmlns:p14="http://schemas.microsoft.com/office/powerpoint/2010/main" val="3026249307"/>
+      </p:ext>
+    </p:extLst>
+  </p:cSld>
+  <p:clrMapOvr>
+    <a:masterClrMapping/>
+  </p:clrMapOvr>
+</p:sld>
+</file>
+
+<file path=ppt/slides/slide4.xml><?xml version="1.0" encoding="utf-8"?>
+<p:sld xmlns:a="http://schemas.openxmlformats.org/drawingml/2006/main" xmlns:r="http://schemas.openxmlformats.org/officeDocument/2006/relationships" xmlns:p="http://schemas.openxmlformats.org/presentationml/2006/main">
+  <p:cSld>
+    <p:spTree>
+      <p:nvGrpSpPr>
+        <p:cNvPr id="1" name=""/>
+        <p:cNvGrpSpPr/>
+        <p:nvPr/>
+      </p:nvGrpSpPr>
+      <p:grpSpPr>
+        <a:xfrm>
+          <a:off x="0" y="0"/>
+          <a:ext cx="0" cy="0"/>
+          <a:chOff x="0" y="0"/>
+          <a:chExt cx="0" cy="0"/>
+        </a:xfrm>
+      </p:grpSpPr>
       <p:sp>
         <p:nvSpPr>
           <p:cNvPr id="5" name="內容版面配置區 4"/>
@@ -3603,13 +3396,13 @@
         </p:nvSpPr>
         <p:spPr>
           <a:xfrm>
-            <a:off x="0" y="1600200"/>
-            <a:ext cx="9144000" cy="4525963"/>
+            <a:off x="0" y="2084851"/>
+            <a:ext cx="12192000" cy="2404863"/>
           </a:xfrm>
         </p:spPr>
         <p:txBody>
-          <a:bodyPr>
-            <a:noAutofit/>
+          <a:bodyPr anchor="ctr">
+            <a:normAutofit/>
           </a:bodyPr>
           <a:lstStyle/>
           <a:p>
@@ -3617,9 +3410,221 @@
               <a:buNone/>
             </a:pPr>
             <a:r>
-              <a:rPr lang="zh-TW" altLang="en-US" sz="5400" b="1" dirty="0">
-                <a:solidFill>
-                  <a:srgbClr val="000066"/>
+              <a:rPr lang="zh-TW" altLang="en-US" sz="6400" b="1" dirty="0">
+                <a:solidFill>
+                  <a:srgbClr val="660033"/>
+                </a:solidFill>
+                <a:latin typeface="微軟正黑體" pitchFamily="34" charset="-120"/>
+                <a:ea typeface="微軟正黑體" pitchFamily="34" charset="-120"/>
+              </a:rPr>
+              <a:t>我仍因救我的神歡欣快樂</a:t>
+            </a:r>
+            <a:endParaRPr lang="en-US" altLang="zh-TW" sz="6400" b="1" dirty="0">
+              <a:solidFill>
+                <a:srgbClr val="660033"/>
+              </a:solidFill>
+              <a:latin typeface="微軟正黑體" pitchFamily="34" charset="-120"/>
+              <a:ea typeface="微軟正黑體" pitchFamily="34" charset="-120"/>
+            </a:endParaRPr>
+          </a:p>
+        </p:txBody>
+      </p:sp>
+    </p:spTree>
+    <p:extLst>
+      <p:ext uri="{BB962C8B-B14F-4D97-AF65-F5344CB8AC3E}">
+        <p14:creationId xmlns:p14="http://schemas.microsoft.com/office/powerpoint/2010/main" val="1716807820"/>
+      </p:ext>
+    </p:extLst>
+  </p:cSld>
+  <p:clrMapOvr>
+    <a:masterClrMapping/>
+  </p:clrMapOvr>
+</p:sld>
+</file>
+
+<file path=ppt/slides/slide5.xml><?xml version="1.0" encoding="utf-8"?>
+<p:sld xmlns:a="http://schemas.openxmlformats.org/drawingml/2006/main" xmlns:r="http://schemas.openxmlformats.org/officeDocument/2006/relationships" xmlns:p="http://schemas.openxmlformats.org/presentationml/2006/main">
+  <p:cSld>
+    <p:spTree>
+      <p:nvGrpSpPr>
+        <p:cNvPr id="1" name=""/>
+        <p:cNvGrpSpPr/>
+        <p:nvPr/>
+      </p:nvGrpSpPr>
+      <p:grpSpPr>
+        <a:xfrm>
+          <a:off x="0" y="0"/>
+          <a:ext cx="0" cy="0"/>
+          <a:chOff x="0" y="0"/>
+          <a:chExt cx="0" cy="0"/>
+        </a:xfrm>
+      </p:grpSpPr>
+      <p:sp>
+        <p:nvSpPr>
+          <p:cNvPr id="5" name="內容版面配置區 4"/>
+          <p:cNvSpPr>
+            <a:spLocks noGrp="1"/>
+          </p:cNvSpPr>
+          <p:nvPr>
+            <p:ph idx="1"/>
+          </p:nvPr>
+        </p:nvSpPr>
+        <p:spPr>
+          <a:xfrm>
+            <a:off x="0" y="2084851"/>
+            <a:ext cx="12192000" cy="2404863"/>
+          </a:xfrm>
+        </p:spPr>
+        <p:txBody>
+          <a:bodyPr anchor="ctr">
+            <a:normAutofit/>
+          </a:bodyPr>
+          <a:lstStyle/>
+          <a:p>
+            <a:pPr algn="ctr">
+              <a:buNone/>
+            </a:pPr>
+            <a:r>
+              <a:rPr lang="zh-TW" altLang="en-US" sz="6400" b="1" dirty="0">
+                <a:solidFill>
+                  <a:srgbClr val="660033"/>
+                </a:solidFill>
+                <a:latin typeface="微軟正黑體" pitchFamily="34" charset="-120"/>
+                <a:ea typeface="微軟正黑體" pitchFamily="34" charset="-120"/>
+              </a:rPr>
+              <a:t>我要讚美</a:t>
+            </a:r>
+            <a:r>
+              <a:rPr lang="en-US" altLang="zh-TW" sz="6400" b="1" dirty="0">
+                <a:solidFill>
+                  <a:srgbClr val="660033"/>
+                </a:solidFill>
+                <a:latin typeface="微軟正黑體" pitchFamily="34" charset="-120"/>
+                <a:ea typeface="微軟正黑體" pitchFamily="34" charset="-120"/>
+              </a:rPr>
+              <a:t>  </a:t>
+            </a:r>
+            <a:r>
+              <a:rPr lang="zh-TW" altLang="en-US" sz="6400" b="1" dirty="0">
+                <a:solidFill>
+                  <a:srgbClr val="660033"/>
+                </a:solidFill>
+                <a:latin typeface="微軟正黑體" pitchFamily="34" charset="-120"/>
+                <a:ea typeface="微軟正黑體" pitchFamily="34" charset="-120"/>
+              </a:rPr>
+              <a:t>無論得時或不得時</a:t>
+            </a:r>
+            <a:endParaRPr lang="en-US" altLang="zh-TW" sz="6400" b="1" dirty="0">
+              <a:solidFill>
+                <a:srgbClr val="660033"/>
+              </a:solidFill>
+              <a:latin typeface="微軟正黑體" pitchFamily="34" charset="-120"/>
+              <a:ea typeface="微軟正黑體" pitchFamily="34" charset="-120"/>
+            </a:endParaRPr>
+          </a:p>
+          <a:p>
+            <a:pPr algn="ctr">
+              <a:buNone/>
+            </a:pPr>
+            <a:r>
+              <a:rPr lang="zh-TW" altLang="en-US" sz="6400" b="1" dirty="0">
+                <a:solidFill>
+                  <a:srgbClr val="660033"/>
+                </a:solidFill>
+                <a:latin typeface="微軟正黑體" pitchFamily="34" charset="-120"/>
+                <a:ea typeface="微軟正黑體" pitchFamily="34" charset="-120"/>
+              </a:rPr>
+              <a:t>我要讚美</a:t>
+            </a:r>
+            <a:r>
+              <a:rPr lang="en-US" altLang="zh-TW" sz="6400" b="1" dirty="0">
+                <a:solidFill>
+                  <a:srgbClr val="660033"/>
+                </a:solidFill>
+                <a:latin typeface="微軟正黑體" pitchFamily="34" charset="-120"/>
+                <a:ea typeface="微軟正黑體" pitchFamily="34" charset="-120"/>
+              </a:rPr>
+              <a:t>  </a:t>
+            </a:r>
+            <a:r>
+              <a:rPr lang="zh-TW" altLang="en-US" sz="6400" b="1" dirty="0">
+                <a:solidFill>
+                  <a:srgbClr val="660033"/>
+                </a:solidFill>
+                <a:latin typeface="微軟正黑體" pitchFamily="34" charset="-120"/>
+                <a:ea typeface="微軟正黑體" pitchFamily="34" charset="-120"/>
+              </a:rPr>
+              <a:t>每天從日出到日落</a:t>
+            </a:r>
+            <a:endParaRPr lang="zh-TW" altLang="en-US" sz="6400" b="1" dirty="0">
+              <a:solidFill>
+                <a:srgbClr val="660033"/>
+              </a:solidFill>
+              <a:latin typeface="微軟正黑體" pitchFamily="34" charset="-120"/>
+              <a:ea typeface="微軟正黑體" pitchFamily="34" charset="-120"/>
+            </a:endParaRPr>
+          </a:p>
+        </p:txBody>
+      </p:sp>
+    </p:spTree>
+    <p:extLst>
+      <p:ext uri="{BB962C8B-B14F-4D97-AF65-F5344CB8AC3E}">
+        <p14:creationId xmlns:p14="http://schemas.microsoft.com/office/powerpoint/2010/main" val="1085690414"/>
+      </p:ext>
+    </p:extLst>
+  </p:cSld>
+  <p:clrMapOvr>
+    <a:masterClrMapping/>
+  </p:clrMapOvr>
+</p:sld>
+</file>
+
+<file path=ppt/slides/slide6.xml><?xml version="1.0" encoding="utf-8"?>
+<p:sld xmlns:a="http://schemas.openxmlformats.org/drawingml/2006/main" xmlns:r="http://schemas.openxmlformats.org/officeDocument/2006/relationships" xmlns:p="http://schemas.openxmlformats.org/presentationml/2006/main">
+  <p:cSld>
+    <p:spTree>
+      <p:nvGrpSpPr>
+        <p:cNvPr id="1" name=""/>
+        <p:cNvGrpSpPr/>
+        <p:nvPr/>
+      </p:nvGrpSpPr>
+      <p:grpSpPr>
+        <a:xfrm>
+          <a:off x="0" y="0"/>
+          <a:ext cx="0" cy="0"/>
+          <a:chOff x="0" y="0"/>
+          <a:chExt cx="0" cy="0"/>
+        </a:xfrm>
+      </p:grpSpPr>
+      <p:sp>
+        <p:nvSpPr>
+          <p:cNvPr id="5" name="內容版面配置區 4"/>
+          <p:cNvSpPr>
+            <a:spLocks noGrp="1"/>
+          </p:cNvSpPr>
+          <p:nvPr>
+            <p:ph idx="1"/>
+          </p:nvPr>
+        </p:nvSpPr>
+        <p:spPr>
+          <a:xfrm>
+            <a:off x="0" y="2084851"/>
+            <a:ext cx="12192000" cy="2404863"/>
+          </a:xfrm>
+        </p:spPr>
+        <p:txBody>
+          <a:bodyPr anchor="ctr">
+            <a:normAutofit/>
+          </a:bodyPr>
+          <a:lstStyle/>
+          <a:p>
+            <a:pPr algn="ctr">
+              <a:buNone/>
+            </a:pPr>
+            <a:r>
+              <a:rPr lang="zh-TW" altLang="en-US" sz="6400" b="1" dirty="0">
+                <a:solidFill>
+                  <a:srgbClr val="660033"/>
                 </a:solidFill>
                 <a:latin typeface="微軟正黑體" pitchFamily="34" charset="-120"/>
                 <a:ea typeface="微軟正黑體" pitchFamily="34" charset="-120"/>
@@ -3627,18 +3632,18 @@
               <a:t>我心堅定於</a:t>
             </a:r>
             <a:r>
-              <a:rPr lang="zh-TW" altLang="en-US" sz="5400" b="1" dirty="0" smtClean="0">
-                <a:solidFill>
-                  <a:srgbClr val="000066"/>
+              <a:rPr lang="zh-CN" altLang="en-US" sz="6400" b="1" dirty="0">
+                <a:solidFill>
+                  <a:srgbClr val="660033"/>
                 </a:solidFill>
                 <a:latin typeface="微軟正黑體" pitchFamily="34" charset="-120"/>
                 <a:ea typeface="微軟正黑體" pitchFamily="34" charset="-120"/>
               </a:rPr>
-              <a:t>你</a:t>
-            </a:r>
-            <a:endParaRPr lang="en-US" altLang="zh-TW" sz="5400" b="1" dirty="0" smtClean="0">
+              <a:t>袮</a:t>
+            </a:r>
+            <a:endParaRPr lang="en-US" altLang="zh-TW" sz="6400" b="1" dirty="0">
               <a:solidFill>
-                <a:srgbClr val="000066"/>
+                <a:srgbClr val="660033"/>
               </a:solidFill>
               <a:latin typeface="微軟正黑體" pitchFamily="34" charset="-120"/>
               <a:ea typeface="微軟正黑體" pitchFamily="34" charset="-120"/>
@@ -3649,80 +3654,93 @@
               <a:buNone/>
             </a:pPr>
             <a:r>
-              <a:rPr lang="zh-TW" altLang="en-US" sz="5400" b="1" dirty="0" smtClean="0">
-                <a:solidFill>
-                  <a:srgbClr val="000066"/>
+              <a:rPr lang="zh-TW" altLang="en-US" sz="6400" b="1" dirty="0">
+                <a:solidFill>
+                  <a:srgbClr val="660033"/>
                 </a:solidFill>
                 <a:latin typeface="微軟正黑體" pitchFamily="34" charset="-120"/>
                 <a:ea typeface="微軟正黑體" pitchFamily="34" charset="-120"/>
               </a:rPr>
-              <a:t>每天</a:t>
-            </a:r>
-            <a:r>
-              <a:rPr lang="zh-TW" altLang="en-US" sz="5400" b="1" dirty="0">
-                <a:solidFill>
-                  <a:srgbClr val="000066"/>
-                </a:solidFill>
-                <a:latin typeface="微軟正黑體" pitchFamily="34" charset="-120"/>
-                <a:ea typeface="微軟正黑體" pitchFamily="34" charset="-120"/>
-              </a:rPr>
-              <a:t>讚美</a:t>
-            </a:r>
-            <a:r>
-              <a:rPr lang="zh-TW" altLang="en-US" sz="5400" b="1" dirty="0" smtClean="0">
-                <a:solidFill>
-                  <a:srgbClr val="000066"/>
-                </a:solidFill>
-                <a:latin typeface="微軟正黑體" pitchFamily="34" charset="-120"/>
-                <a:ea typeface="微軟正黑體" pitchFamily="34" charset="-120"/>
-              </a:rPr>
-              <a:t>不停</a:t>
-            </a:r>
-            <a:endParaRPr lang="en-US" altLang="zh-TW" sz="5400" b="1" dirty="0" smtClean="0">
+              <a:t>每天讚美不停</a:t>
+            </a:r>
+            <a:endParaRPr lang="en-US" altLang="zh-TW" sz="6400" b="1" dirty="0">
               <a:solidFill>
-                <a:srgbClr val="000066"/>
+                <a:srgbClr val="660033"/>
               </a:solidFill>
               <a:latin typeface="微軟正黑體" pitchFamily="34" charset="-120"/>
               <a:ea typeface="微軟正黑體" pitchFamily="34" charset="-120"/>
             </a:endParaRPr>
           </a:p>
+        </p:txBody>
+      </p:sp>
+    </p:spTree>
+    <p:extLst>
+      <p:ext uri="{BB962C8B-B14F-4D97-AF65-F5344CB8AC3E}">
+        <p14:creationId xmlns:p14="http://schemas.microsoft.com/office/powerpoint/2010/main" val="2617493512"/>
+      </p:ext>
+    </p:extLst>
+  </p:cSld>
+  <p:clrMapOvr>
+    <a:masterClrMapping/>
+  </p:clrMapOvr>
+</p:sld>
+</file>
+
+<file path=ppt/slides/slide7.xml><?xml version="1.0" encoding="utf-8"?>
+<p:sld xmlns:a="http://schemas.openxmlformats.org/drawingml/2006/main" xmlns:r="http://schemas.openxmlformats.org/officeDocument/2006/relationships" xmlns:p="http://schemas.openxmlformats.org/presentationml/2006/main">
+  <p:cSld>
+    <p:spTree>
+      <p:nvGrpSpPr>
+        <p:cNvPr id="1" name=""/>
+        <p:cNvGrpSpPr/>
+        <p:nvPr/>
+      </p:nvGrpSpPr>
+      <p:grpSpPr>
+        <a:xfrm>
+          <a:off x="0" y="0"/>
+          <a:ext cx="0" cy="0"/>
+          <a:chOff x="0" y="0"/>
+          <a:chExt cx="0" cy="0"/>
+        </a:xfrm>
+      </p:grpSpPr>
+      <p:sp>
+        <p:nvSpPr>
+          <p:cNvPr id="5" name="內容版面配置區 4"/>
+          <p:cNvSpPr>
+            <a:spLocks noGrp="1"/>
+          </p:cNvSpPr>
+          <p:nvPr>
+            <p:ph idx="1"/>
+          </p:nvPr>
+        </p:nvSpPr>
+        <p:spPr>
+          <a:xfrm>
+            <a:off x="0" y="2084851"/>
+            <a:ext cx="12192000" cy="2404863"/>
+          </a:xfrm>
+        </p:spPr>
+        <p:txBody>
+          <a:bodyPr anchor="ctr">
+            <a:normAutofit/>
+          </a:bodyPr>
+          <a:lstStyle/>
           <a:p>
             <a:pPr algn="ctr">
               <a:buNone/>
             </a:pPr>
             <a:r>
-              <a:rPr lang="zh-TW" altLang="en-US" sz="5400" b="1" dirty="0" smtClean="0">
-                <a:solidFill>
-                  <a:srgbClr val="000066"/>
+              <a:rPr lang="zh-TW" altLang="en-US" sz="6400" b="1" dirty="0">
+                <a:solidFill>
+                  <a:srgbClr val="660033"/>
                 </a:solidFill>
                 <a:latin typeface="微軟正黑體" pitchFamily="34" charset="-120"/>
                 <a:ea typeface="微軟正黑體" pitchFamily="34" charset="-120"/>
               </a:rPr>
-              <a:t>我</a:t>
-            </a:r>
-            <a:r>
-              <a:rPr lang="zh-TW" altLang="en-US" sz="5400" b="1" dirty="0">
-                <a:solidFill>
-                  <a:srgbClr val="000066"/>
-                </a:solidFill>
-                <a:latin typeface="微軟正黑體" pitchFamily="34" charset="-120"/>
-                <a:ea typeface="微軟正黑體" pitchFamily="34" charset="-120"/>
-              </a:rPr>
-              <a:t>要</a:t>
-            </a:r>
-            <a:r>
-              <a:rPr lang="zh-TW" altLang="en-US" sz="5400" b="1" dirty="0" smtClean="0">
-                <a:solidFill>
-                  <a:srgbClr val="000066"/>
-                </a:solidFill>
-                <a:latin typeface="微軟正黑體" pitchFamily="34" charset="-120"/>
-                <a:ea typeface="微軟正黑體" pitchFamily="34" charset="-120"/>
-              </a:rPr>
-              <a:t>讚美  跳舞讚美</a:t>
-            </a:r>
-            <a:endParaRPr lang="en-US" altLang="zh-TW" sz="5400" b="1" dirty="0">
+              <a:t>我要讚美  跳舞讚美</a:t>
+            </a:r>
+            <a:endParaRPr lang="en-US" altLang="zh-TW" sz="6400" b="1" dirty="0">
               <a:solidFill>
-                <a:srgbClr val="000066"/>
+                <a:srgbClr val="660033"/>
               </a:solidFill>
               <a:latin typeface="微軟正黑體" pitchFamily="34" charset="-120"/>
               <a:ea typeface="微軟正黑體" pitchFamily="34" charset="-120"/>
@@ -3733,71 +3751,126 @@
               <a:buNone/>
             </a:pPr>
             <a:r>
-              <a:rPr lang="zh-TW" altLang="en-US" sz="5400" b="1" dirty="0" smtClean="0">
-                <a:solidFill>
-                  <a:srgbClr val="000066"/>
+              <a:rPr lang="zh-TW" altLang="en-US" sz="6400" b="1" dirty="0">
+                <a:solidFill>
+                  <a:srgbClr val="660033"/>
                 </a:solidFill>
                 <a:latin typeface="微軟正黑體" pitchFamily="34" charset="-120"/>
                 <a:ea typeface="微軟正黑體" pitchFamily="34" charset="-120"/>
               </a:rPr>
-              <a:t>我</a:t>
-            </a:r>
-            <a:r>
-              <a:rPr lang="zh-TW" altLang="en-US" sz="5400" b="1" dirty="0">
-                <a:solidFill>
-                  <a:srgbClr val="000066"/>
-                </a:solidFill>
-                <a:latin typeface="微軟正黑體" pitchFamily="34" charset="-120"/>
-                <a:ea typeface="微軟正黑體" pitchFamily="34" charset="-120"/>
-              </a:rPr>
-              <a:t>要</a:t>
-            </a:r>
-            <a:r>
-              <a:rPr lang="zh-TW" altLang="en-US" sz="5400" b="1" dirty="0" smtClean="0">
-                <a:solidFill>
-                  <a:srgbClr val="000066"/>
-                </a:solidFill>
-                <a:latin typeface="微軟正黑體" pitchFamily="34" charset="-120"/>
-                <a:ea typeface="微軟正黑體" pitchFamily="34" charset="-120"/>
-              </a:rPr>
-              <a:t>讚美  自由讚美</a:t>
-            </a:r>
-            <a:endParaRPr lang="en-US" altLang="zh-TW" sz="5400" b="1" dirty="0" smtClean="0">
+              <a:t>我要讚美  自由讚美</a:t>
+            </a:r>
+            <a:endParaRPr lang="en-US" altLang="zh-TW" sz="6400" b="1" dirty="0">
               <a:solidFill>
-                <a:srgbClr val="000066"/>
+                <a:srgbClr val="660033"/>
               </a:solidFill>
               <a:latin typeface="微軟正黑體" pitchFamily="34" charset="-120"/>
               <a:ea typeface="微軟正黑體" pitchFamily="34" charset="-120"/>
             </a:endParaRPr>
           </a:p>
+        </p:txBody>
+      </p:sp>
+    </p:spTree>
+    <p:extLst>
+      <p:ext uri="{BB962C8B-B14F-4D97-AF65-F5344CB8AC3E}">
+        <p14:creationId xmlns:p14="http://schemas.microsoft.com/office/powerpoint/2010/main" val="1203392314"/>
+      </p:ext>
+    </p:extLst>
+  </p:cSld>
+  <p:clrMapOvr>
+    <a:masterClrMapping/>
+  </p:clrMapOvr>
+</p:sld>
+</file>
+
+<file path=ppt/slides/slide8.xml><?xml version="1.0" encoding="utf-8"?>
+<p:sld xmlns:a="http://schemas.openxmlformats.org/drawingml/2006/main" xmlns:r="http://schemas.openxmlformats.org/officeDocument/2006/relationships" xmlns:p="http://schemas.openxmlformats.org/presentationml/2006/main">
+  <p:cSld>
+    <p:spTree>
+      <p:nvGrpSpPr>
+        <p:cNvPr id="1" name=""/>
+        <p:cNvGrpSpPr/>
+        <p:nvPr/>
+      </p:nvGrpSpPr>
+      <p:grpSpPr>
+        <a:xfrm>
+          <a:off x="0" y="0"/>
+          <a:ext cx="0" cy="0"/>
+          <a:chOff x="0" y="0"/>
+          <a:chExt cx="0" cy="0"/>
+        </a:xfrm>
+      </p:grpSpPr>
+      <p:sp>
+        <p:nvSpPr>
+          <p:cNvPr id="5" name="內容版面配置區 4"/>
+          <p:cNvSpPr>
+            <a:spLocks noGrp="1"/>
+          </p:cNvSpPr>
+          <p:nvPr>
+            <p:ph idx="1"/>
+          </p:nvPr>
+        </p:nvSpPr>
+        <p:spPr>
+          <a:xfrm>
+            <a:off x="0" y="2084851"/>
+            <a:ext cx="12192000" cy="2404863"/>
+          </a:xfrm>
+        </p:spPr>
+        <p:txBody>
+          <a:bodyPr anchor="ctr">
+            <a:normAutofit/>
+          </a:bodyPr>
+          <a:lstStyle/>
           <a:p>
             <a:pPr algn="ctr">
               <a:buNone/>
             </a:pPr>
             <a:r>
-              <a:rPr lang="zh-TW" altLang="en-US" sz="5400" b="1" dirty="0" smtClean="0">
-                <a:solidFill>
-                  <a:srgbClr val="000066"/>
+              <a:rPr lang="zh-TW" altLang="en-US" sz="6400" b="1" dirty="0">
+                <a:solidFill>
+                  <a:srgbClr val="660033"/>
                 </a:solidFill>
                 <a:latin typeface="微軟正黑體" pitchFamily="34" charset="-120"/>
                 <a:ea typeface="微軟正黑體" pitchFamily="34" charset="-120"/>
               </a:rPr>
-              <a:t>大聲</a:t>
-            </a:r>
-            <a:r>
-              <a:rPr lang="zh-TW" altLang="en-US" sz="5400" b="1" dirty="0">
-                <a:solidFill>
-                  <a:srgbClr val="000066"/>
+              <a:t>大聲歡呼</a:t>
+            </a:r>
+            <a:r>
+              <a:rPr lang="zh-CN" altLang="en-US" sz="6400" b="1" dirty="0">
+                <a:solidFill>
+                  <a:srgbClr val="660033"/>
                 </a:solidFill>
                 <a:latin typeface="微軟正黑體" pitchFamily="34" charset="-120"/>
                 <a:ea typeface="微軟正黑體" pitchFamily="34" charset="-120"/>
               </a:rPr>
-              <a:t>歡呼你是永遠得勝君王</a:t>
-            </a:r>
+              <a:t>袮</a:t>
+            </a:r>
+            <a:r>
+              <a:rPr lang="zh-TW" altLang="en-US" sz="6400" b="1" dirty="0">
+                <a:solidFill>
+                  <a:srgbClr val="660033"/>
+                </a:solidFill>
+                <a:latin typeface="微軟正黑體" pitchFamily="34" charset="-120"/>
+                <a:ea typeface="微軟正黑體" pitchFamily="34" charset="-120"/>
+              </a:rPr>
+              <a:t>是永遠得勝君王</a:t>
+            </a:r>
+            <a:endParaRPr lang="zh-TW" altLang="en-US" sz="6400" b="1" dirty="0">
+              <a:solidFill>
+                <a:srgbClr val="660033"/>
+              </a:solidFill>
+              <a:latin typeface="微軟正黑體" pitchFamily="34" charset="-120"/>
+              <a:ea typeface="微軟正黑體" pitchFamily="34" charset="-120"/>
+            </a:endParaRPr>
           </a:p>
         </p:txBody>
       </p:sp>
     </p:spTree>
+    <p:extLst>
+      <p:ext uri="{BB962C8B-B14F-4D97-AF65-F5344CB8AC3E}">
+        <p14:creationId xmlns:p14="http://schemas.microsoft.com/office/powerpoint/2010/main" val="2937962199"/>
+      </p:ext>
+    </p:extLst>
   </p:cSld>
   <p:clrMapOvr>
     <a:masterClrMapping/>

</xml_diff>